<commit_message>
added sound test + bug correction on dual N-back (instructions not shown in the last block) + questionnaires presession 1-3
</commit_message>
<xml_diff>
--- a/tasks/Complex_OpenMATB/includes/img/instructions.pptx
+++ b/tasks/Complex_OpenMATB/includes/img/instructions.pptx
@@ -138,14 +138,6 @@
     </p:ext>
   </p:extLst>
 </p:presentation>
-</file>
-
-<file path=ppt/revisionInfo.xml><?xml version="1.0" encoding="utf-8"?>
-<p1510:revInfo xmlns:a="http://schemas.openxmlformats.org/drawingml/2006/main" xmlns:r="http://schemas.openxmlformats.org/officeDocument/2006/relationships" xmlns:p1510="http://schemas.microsoft.com/office/powerpoint/2015/10/main">
-  <p1510:revLst>
-    <p1510:client id="{6C1F7C2F-C4FA-4540-919A-1E34FFF6DA20}" v="66" dt="2025-01-31T16:22:57.488"/>
-  </p1510:revLst>
-</p1510:revInfo>
 </file>
 
 <file path=ppt/changesInfos/changesInfo1.xml><?xml version="1.0" encoding="utf-8"?>
@@ -1732,6 +1724,45 @@
       </pc:sldChg>
     </pc:docChg>
   </pc:docChgLst>
+  <pc:docChgLst>
+    <pc:chgData name="Quentin CHENOT" userId="35a74e8c-e956-44d1-9675-8021ea301a00" providerId="ADAL" clId="{7F9F935C-D425-4C43-9B95-8271A82A6055}"/>
+    <pc:docChg chg="modSld">
+      <pc:chgData name="Quentin CHENOT" userId="35a74e8c-e956-44d1-9675-8021ea301a00" providerId="ADAL" clId="{7F9F935C-D425-4C43-9B95-8271A82A6055}" dt="2025-02-17T09:56:42.784" v="13" actId="20577"/>
+      <pc:docMkLst>
+        <pc:docMk/>
+      </pc:docMkLst>
+      <pc:sldChg chg="modSp mod">
+        <pc:chgData name="Quentin CHENOT" userId="35a74e8c-e956-44d1-9675-8021ea301a00" providerId="ADAL" clId="{7F9F935C-D425-4C43-9B95-8271A82A6055}" dt="2025-02-17T09:55:52.065" v="7" actId="20577"/>
+        <pc:sldMkLst>
+          <pc:docMk/>
+          <pc:sldMk cId="3003168146" sldId="266"/>
+        </pc:sldMkLst>
+        <pc:spChg chg="mod">
+          <ac:chgData name="Quentin CHENOT" userId="35a74e8c-e956-44d1-9675-8021ea301a00" providerId="ADAL" clId="{7F9F935C-D425-4C43-9B95-8271A82A6055}" dt="2025-02-17T09:55:52.065" v="7" actId="20577"/>
+          <ac:spMkLst>
+            <pc:docMk/>
+            <pc:sldMk cId="3003168146" sldId="266"/>
+            <ac:spMk id="22" creationId="{43BECAD7-B307-BF15-4661-B5C9369DD192}"/>
+          </ac:spMkLst>
+        </pc:spChg>
+      </pc:sldChg>
+      <pc:sldChg chg="modSp mod">
+        <pc:chgData name="Quentin CHENOT" userId="35a74e8c-e956-44d1-9675-8021ea301a00" providerId="ADAL" clId="{7F9F935C-D425-4C43-9B95-8271A82A6055}" dt="2025-02-17T09:56:42.784" v="13" actId="20577"/>
+        <pc:sldMkLst>
+          <pc:docMk/>
+          <pc:sldMk cId="2629254205" sldId="279"/>
+        </pc:sldMkLst>
+        <pc:spChg chg="mod">
+          <ac:chgData name="Quentin CHENOT" userId="35a74e8c-e956-44d1-9675-8021ea301a00" providerId="ADAL" clId="{7F9F935C-D425-4C43-9B95-8271A82A6055}" dt="2025-02-17T09:56:42.784" v="13" actId="20577"/>
+          <ac:spMkLst>
+            <pc:docMk/>
+            <pc:sldMk cId="2629254205" sldId="279"/>
+            <ac:spMk id="22" creationId="{43BECAD7-B307-BF15-4661-B5C9369DD192}"/>
+          </ac:spMkLst>
+        </pc:spChg>
+      </pc:sldChg>
+    </pc:docChg>
+  </pc:docChgLst>
 </pc:chgInfo>
 </file>
 
@@ -1884,7 +1915,7 @@
           <a:p>
             <a:fld id="{2065C1B6-88FB-45B1-A5B9-9967ACF177CF}" type="datetimeFigureOut">
               <a:rPr lang="en-US" smtClean="0"/>
-              <a:t>1/31/2025</a:t>
+              <a:t>2/17/2025</a:t>
             </a:fld>
             <a:endParaRPr lang="en-US"/>
           </a:p>
@@ -2084,7 +2115,7 @@
           <a:p>
             <a:fld id="{2065C1B6-88FB-45B1-A5B9-9967ACF177CF}" type="datetimeFigureOut">
               <a:rPr lang="en-US" smtClean="0"/>
-              <a:t>1/31/2025</a:t>
+              <a:t>2/17/2025</a:t>
             </a:fld>
             <a:endParaRPr lang="en-US"/>
           </a:p>
@@ -2294,7 +2325,7 @@
           <a:p>
             <a:fld id="{2065C1B6-88FB-45B1-A5B9-9967ACF177CF}" type="datetimeFigureOut">
               <a:rPr lang="en-US" smtClean="0"/>
-              <a:t>1/31/2025</a:t>
+              <a:t>2/17/2025</a:t>
             </a:fld>
             <a:endParaRPr lang="en-US"/>
           </a:p>
@@ -2494,7 +2525,7 @@
           <a:p>
             <a:fld id="{2065C1B6-88FB-45B1-A5B9-9967ACF177CF}" type="datetimeFigureOut">
               <a:rPr lang="en-US" smtClean="0"/>
-              <a:t>1/31/2025</a:t>
+              <a:t>2/17/2025</a:t>
             </a:fld>
             <a:endParaRPr lang="en-US"/>
           </a:p>
@@ -2770,7 +2801,7 @@
           <a:p>
             <a:fld id="{2065C1B6-88FB-45B1-A5B9-9967ACF177CF}" type="datetimeFigureOut">
               <a:rPr lang="en-US" smtClean="0"/>
-              <a:t>1/31/2025</a:t>
+              <a:t>2/17/2025</a:t>
             </a:fld>
             <a:endParaRPr lang="en-US"/>
           </a:p>
@@ -3038,7 +3069,7 @@
           <a:p>
             <a:fld id="{2065C1B6-88FB-45B1-A5B9-9967ACF177CF}" type="datetimeFigureOut">
               <a:rPr lang="en-US" smtClean="0"/>
-              <a:t>1/31/2025</a:t>
+              <a:t>2/17/2025</a:t>
             </a:fld>
             <a:endParaRPr lang="en-US"/>
           </a:p>
@@ -3453,7 +3484,7 @@
           <a:p>
             <a:fld id="{2065C1B6-88FB-45B1-A5B9-9967ACF177CF}" type="datetimeFigureOut">
               <a:rPr lang="en-US" smtClean="0"/>
-              <a:t>1/31/2025</a:t>
+              <a:t>2/17/2025</a:t>
             </a:fld>
             <a:endParaRPr lang="en-US"/>
           </a:p>
@@ -3595,7 +3626,7 @@
           <a:p>
             <a:fld id="{2065C1B6-88FB-45B1-A5B9-9967ACF177CF}" type="datetimeFigureOut">
               <a:rPr lang="en-US" smtClean="0"/>
-              <a:t>1/31/2025</a:t>
+              <a:t>2/17/2025</a:t>
             </a:fld>
             <a:endParaRPr lang="en-US"/>
           </a:p>
@@ -3708,7 +3739,7 @@
           <a:p>
             <a:fld id="{2065C1B6-88FB-45B1-A5B9-9967ACF177CF}" type="datetimeFigureOut">
               <a:rPr lang="en-US" smtClean="0"/>
-              <a:t>1/31/2025</a:t>
+              <a:t>2/17/2025</a:t>
             </a:fld>
             <a:endParaRPr lang="en-US"/>
           </a:p>
@@ -4021,7 +4052,7 @@
           <a:p>
             <a:fld id="{2065C1B6-88FB-45B1-A5B9-9967ACF177CF}" type="datetimeFigureOut">
               <a:rPr lang="en-US" smtClean="0"/>
-              <a:t>1/31/2025</a:t>
+              <a:t>2/17/2025</a:t>
             </a:fld>
             <a:endParaRPr lang="en-US"/>
           </a:p>
@@ -4310,7 +4341,7 @@
           <a:p>
             <a:fld id="{2065C1B6-88FB-45B1-A5B9-9967ACF177CF}" type="datetimeFigureOut">
               <a:rPr lang="en-US" smtClean="0"/>
-              <a:t>1/31/2025</a:t>
+              <a:t>2/17/2025</a:t>
             </a:fld>
             <a:endParaRPr lang="en-US"/>
           </a:p>
@@ -4553,7 +4584,7 @@
           <a:p>
             <a:fld id="{2065C1B6-88FB-45B1-A5B9-9967ACF177CF}" type="datetimeFigureOut">
               <a:rPr lang="en-US" smtClean="0"/>
-              <a:t>1/31/2025</a:t>
+              <a:t>2/17/2025</a:t>
             </a:fld>
             <a:endParaRPr lang="en-US"/>
           </a:p>
@@ -8841,7 +8872,7 @@
                 <a:latin typeface="Arial" panose="020B0604020202020204" pitchFamily="34" charset="0"/>
                 <a:cs typeface="Arial" panose="020B0604020202020204" pitchFamily="34" charset="0"/>
               </a:rPr>
-              <a:t>Arrows will move on indicators:</a:t>
+              <a:t>Arrows will move on gauges:</a:t>
             </a:r>
           </a:p>
           <a:p>
@@ -15187,7 +15218,7 @@
                 <a:latin typeface="Arial" panose="020B0604020202020204" pitchFamily="34" charset="0"/>
                 <a:cs typeface="Arial" panose="020B0604020202020204" pitchFamily="34" charset="0"/>
               </a:rPr>
-              <a:t>Des flèches vont bouger sur des indicateurs:</a:t>
+              <a:t>Des flèches vont bouger sur des jauges:</a:t>
             </a:r>
           </a:p>
           <a:p>

</xml_diff>